<commit_message>
added finalized code + final figure
</commit_message>
<xml_diff>
--- a/helpful_explanation.pptx
+++ b/helpful_explanation.pptx
@@ -600,11 +600,11 @@
           <a:lstStyle/>
           <a:p>
             <a:r>
-              <a:rPr lang="en-US"/>
+              <a:rPr lang="en-US" dirty="0"/>
               <a:t>ASV - </a:t>
             </a:r>
             <a:r>
-              <a:rPr lang="en-US" b="0" i="0" u="none" strike="noStrike">
+              <a:rPr lang="en-US" b="0" i="0" u="none" strike="noStrike" dirty="0">
                 <a:solidFill>
                   <a:srgbClr val="040C28"/>
                 </a:solidFill>
@@ -613,7 +613,7 @@
               </a:rPr>
               <a:t>Amplicon Sequence Variant</a:t>
             </a:r>
-            <a:endParaRPr lang="en-US"/>
+            <a:endParaRPr lang="en-US" dirty="0"/>
           </a:p>
         </p:txBody>
       </p:sp>

</xml_diff>